<commit_message>
RecordGPT working prototype completed
</commit_message>
<xml_diff>
--- a/PlaybackGPT.pptx
+++ b/PlaybackGPT.pptx
@@ -5,21 +5,25 @@
     <p:sldMasterId id="2147484233" r:id="rId1"/>
   </p:sldMasterIdLst>
   <p:notesMasterIdLst>
-    <p:notesMasterId r:id="rId11"/>
+    <p:notesMasterId r:id="rId15"/>
   </p:notesMasterIdLst>
   <p:handoutMasterIdLst>
-    <p:handoutMasterId r:id="rId12"/>
+    <p:handoutMasterId r:id="rId16"/>
   </p:handoutMasterIdLst>
   <p:sldIdLst>
     <p:sldId id="256" r:id="rId2"/>
     <p:sldId id="257" r:id="rId3"/>
-    <p:sldId id="263" r:id="rId4"/>
-    <p:sldId id="265" r:id="rId5"/>
-    <p:sldId id="258" r:id="rId6"/>
+    <p:sldId id="258" r:id="rId4"/>
+    <p:sldId id="263" r:id="rId5"/>
+    <p:sldId id="265" r:id="rId6"/>
     <p:sldId id="260" r:id="rId7"/>
     <p:sldId id="264" r:id="rId8"/>
     <p:sldId id="261" r:id="rId9"/>
     <p:sldId id="259" r:id="rId10"/>
+    <p:sldId id="266" r:id="rId11"/>
+    <p:sldId id="267" r:id="rId12"/>
+    <p:sldId id="268" r:id="rId13"/>
+    <p:sldId id="269" r:id="rId14"/>
   </p:sldIdLst>
   <p:sldSz cx="12192000" cy="6858000"/>
   <p:notesSz cx="7023100" cy="9309100"/>
@@ -215,7 +219,7 @@
             <a:fld id="{E7A8D578-5E90-413C-9512-130603CF2639}" type="datetimeFigureOut">
               <a:rPr lang="en-US" sz="1000" i="1"/>
               <a:pPr algn="l"/>
-              <a:t>11/15/2023</a:t>
+              <a:t>11/21/2023</a:t>
             </a:fld>
             <a:endParaRPr lang="en-US" sz="1000" i="1" dirty="0"/>
           </a:p>
@@ -611,7 +615,7 @@
           <a:p>
             <a:fld id="{76052FF9-2A45-F143-A9E3-2C98D6266DD3}" type="datetimeFigureOut">
               <a:rPr lang="en-US" smtClean="0"/>
-              <a:t>11/15/2023</a:t>
+              <a:t>11/21/2023</a:t>
             </a:fld>
             <a:endParaRPr lang="en-US"/>
           </a:p>
@@ -18576,6 +18580,424 @@
 </p:sldLayout>
 </file>
 
+<file path=ppt/slideLayouts/slideLayout28.xml><?xml version="1.0" encoding="utf-8"?>
+<p:sldLayout xmlns:a="http://schemas.openxmlformats.org/drawingml/2006/main" xmlns:r="http://schemas.openxmlformats.org/officeDocument/2006/relationships" xmlns:p="http://schemas.openxmlformats.org/presentationml/2006/main" type="title">
+  <p:cSld name="Title Slide">
+    <p:spTree>
+      <p:nvGrpSpPr>
+        <p:cNvPr id="1" name=""/>
+        <p:cNvGrpSpPr/>
+        <p:nvPr/>
+      </p:nvGrpSpPr>
+      <p:grpSpPr>
+        <a:xfrm>
+          <a:off x="0" y="0"/>
+          <a:ext cx="0" cy="0"/>
+          <a:chOff x="0" y="0"/>
+          <a:chExt cx="0" cy="0"/>
+        </a:xfrm>
+      </p:grpSpPr>
+      <p:sp>
+        <p:nvSpPr>
+          <p:cNvPr id="2" name="Title 1">
+            <a:extLst>
+              <a:ext uri="{FF2B5EF4-FFF2-40B4-BE49-F238E27FC236}">
+                <a16:creationId xmlns:a16="http://schemas.microsoft.com/office/drawing/2014/main" id="{A0350FA3-A9CB-6138-EF88-7B44061C1DDC}"/>
+              </a:ext>
+            </a:extLst>
+          </p:cNvPr>
+          <p:cNvSpPr>
+            <a:spLocks noGrp="1"/>
+          </p:cNvSpPr>
+          <p:nvPr>
+            <p:ph type="ctrTitle"/>
+          </p:nvPr>
+        </p:nvSpPr>
+        <p:spPr>
+          <a:xfrm>
+            <a:off x="1524000" y="1122363"/>
+            <a:ext cx="9144000" cy="2387600"/>
+          </a:xfrm>
+        </p:spPr>
+        <p:txBody>
+          <a:bodyPr anchor="b"/>
+          <a:lstStyle>
+            <a:lvl1pPr algn="ctr">
+              <a:defRPr sz="6000"/>
+            </a:lvl1pPr>
+          </a:lstStyle>
+          <a:p>
+            <a:r>
+              <a:rPr lang="en-US"/>
+              <a:t>Click to edit Master title style</a:t>
+            </a:r>
+          </a:p>
+        </p:txBody>
+      </p:sp>
+      <p:sp>
+        <p:nvSpPr>
+          <p:cNvPr id="3" name="Subtitle 2">
+            <a:extLst>
+              <a:ext uri="{FF2B5EF4-FFF2-40B4-BE49-F238E27FC236}">
+                <a16:creationId xmlns:a16="http://schemas.microsoft.com/office/drawing/2014/main" id="{132DD9AF-2C23-EB4D-717F-6B4F0106C0EB}"/>
+              </a:ext>
+            </a:extLst>
+          </p:cNvPr>
+          <p:cNvSpPr>
+            <a:spLocks noGrp="1"/>
+          </p:cNvSpPr>
+          <p:nvPr>
+            <p:ph type="subTitle" idx="1"/>
+          </p:nvPr>
+        </p:nvSpPr>
+        <p:spPr>
+          <a:xfrm>
+            <a:off x="1524000" y="3602038"/>
+            <a:ext cx="9144000" cy="1655762"/>
+          </a:xfrm>
+        </p:spPr>
+        <p:txBody>
+          <a:bodyPr/>
+          <a:lstStyle>
+            <a:lvl1pPr marL="0" indent="0" algn="ctr">
+              <a:buNone/>
+              <a:defRPr sz="2400"/>
+            </a:lvl1pPr>
+            <a:lvl2pPr marL="457200" indent="0" algn="ctr">
+              <a:buNone/>
+              <a:defRPr sz="2000"/>
+            </a:lvl2pPr>
+            <a:lvl3pPr marL="914400" indent="0" algn="ctr">
+              <a:buNone/>
+              <a:defRPr sz="1800"/>
+            </a:lvl3pPr>
+            <a:lvl4pPr marL="1371600" indent="0" algn="ctr">
+              <a:buNone/>
+              <a:defRPr sz="1600"/>
+            </a:lvl4pPr>
+            <a:lvl5pPr marL="1828800" indent="0" algn="ctr">
+              <a:buNone/>
+              <a:defRPr sz="1600"/>
+            </a:lvl5pPr>
+            <a:lvl6pPr marL="2286000" indent="0" algn="ctr">
+              <a:buNone/>
+              <a:defRPr sz="1600"/>
+            </a:lvl6pPr>
+            <a:lvl7pPr marL="2743200" indent="0" algn="ctr">
+              <a:buNone/>
+              <a:defRPr sz="1600"/>
+            </a:lvl7pPr>
+            <a:lvl8pPr marL="3200400" indent="0" algn="ctr">
+              <a:buNone/>
+              <a:defRPr sz="1600"/>
+            </a:lvl8pPr>
+            <a:lvl9pPr marL="3657600" indent="0" algn="ctr">
+              <a:buNone/>
+              <a:defRPr sz="1600"/>
+            </a:lvl9pPr>
+          </a:lstStyle>
+          <a:p>
+            <a:r>
+              <a:rPr lang="en-US"/>
+              <a:t>Click to edit Master subtitle style</a:t>
+            </a:r>
+          </a:p>
+        </p:txBody>
+      </p:sp>
+      <p:sp>
+        <p:nvSpPr>
+          <p:cNvPr id="4" name="Date Placeholder 3">
+            <a:extLst>
+              <a:ext uri="{FF2B5EF4-FFF2-40B4-BE49-F238E27FC236}">
+                <a16:creationId xmlns:a16="http://schemas.microsoft.com/office/drawing/2014/main" id="{1FC37888-FE84-8B52-705E-F7D3AAC7B159}"/>
+              </a:ext>
+            </a:extLst>
+          </p:cNvPr>
+          <p:cNvSpPr>
+            <a:spLocks noGrp="1"/>
+          </p:cNvSpPr>
+          <p:nvPr>
+            <p:ph type="dt" sz="half" idx="10"/>
+          </p:nvPr>
+        </p:nvSpPr>
+        <p:spPr/>
+        <p:txBody>
+          <a:bodyPr/>
+          <a:lstStyle/>
+          <a:p>
+            <a:fld id="{B0D8FE7D-1B7D-4F64-9A61-BC4E7F9D9BA8}" type="datetimeFigureOut">
+              <a:rPr lang="en-US" smtClean="0"/>
+              <a:t>11/21/2023</a:t>
+            </a:fld>
+            <a:endParaRPr lang="en-US"/>
+          </a:p>
+        </p:txBody>
+      </p:sp>
+      <p:sp>
+        <p:nvSpPr>
+          <p:cNvPr id="5" name="Footer Placeholder 4">
+            <a:extLst>
+              <a:ext uri="{FF2B5EF4-FFF2-40B4-BE49-F238E27FC236}">
+                <a16:creationId xmlns:a16="http://schemas.microsoft.com/office/drawing/2014/main" id="{E1A2F975-AD94-C9A2-CCE8-3C08BA4F1D7D}"/>
+              </a:ext>
+            </a:extLst>
+          </p:cNvPr>
+          <p:cNvSpPr>
+            <a:spLocks noGrp="1"/>
+          </p:cNvSpPr>
+          <p:nvPr>
+            <p:ph type="ftr" sz="quarter" idx="11"/>
+          </p:nvPr>
+        </p:nvSpPr>
+        <p:spPr/>
+        <p:txBody>
+          <a:bodyPr/>
+          <a:lstStyle/>
+          <a:p>
+            <a:endParaRPr lang="en-US"/>
+          </a:p>
+        </p:txBody>
+      </p:sp>
+      <p:sp>
+        <p:nvSpPr>
+          <p:cNvPr id="6" name="Slide Number Placeholder 5">
+            <a:extLst>
+              <a:ext uri="{FF2B5EF4-FFF2-40B4-BE49-F238E27FC236}">
+                <a16:creationId xmlns:a16="http://schemas.microsoft.com/office/drawing/2014/main" id="{D0453352-C8F6-5968-F85A-B1DA14426A28}"/>
+              </a:ext>
+            </a:extLst>
+          </p:cNvPr>
+          <p:cNvSpPr>
+            <a:spLocks noGrp="1"/>
+          </p:cNvSpPr>
+          <p:nvPr>
+            <p:ph type="sldNum" sz="quarter" idx="12"/>
+          </p:nvPr>
+        </p:nvSpPr>
+        <p:spPr/>
+        <p:txBody>
+          <a:bodyPr/>
+          <a:lstStyle/>
+          <a:p>
+            <a:fld id="{0A576EAE-BE0D-48C0-BC58-366ED3EB5064}" type="slidenum">
+              <a:rPr lang="en-US" smtClean="0"/>
+              <a:t>‹#›</a:t>
+            </a:fld>
+            <a:endParaRPr lang="en-US"/>
+          </a:p>
+        </p:txBody>
+      </p:sp>
+    </p:spTree>
+    <p:extLst>
+      <p:ext uri="{BB962C8B-B14F-4D97-AF65-F5344CB8AC3E}">
+        <p14:creationId xmlns:p14="http://schemas.microsoft.com/office/powerpoint/2010/main" val="2156872724"/>
+      </p:ext>
+    </p:extLst>
+  </p:cSld>
+  <p:clrMapOvr>
+    <a:masterClrMapping/>
+  </p:clrMapOvr>
+</p:sldLayout>
+</file>
+
+<file path=ppt/slideLayouts/slideLayout29.xml><?xml version="1.0" encoding="utf-8"?>
+<p:sldLayout xmlns:a="http://schemas.openxmlformats.org/drawingml/2006/main" xmlns:r="http://schemas.openxmlformats.org/officeDocument/2006/relationships" xmlns:p="http://schemas.openxmlformats.org/presentationml/2006/main" type="obj">
+  <p:cSld name="Title and Content">
+    <p:spTree>
+      <p:nvGrpSpPr>
+        <p:cNvPr id="1" name=""/>
+        <p:cNvGrpSpPr/>
+        <p:nvPr/>
+      </p:nvGrpSpPr>
+      <p:grpSpPr>
+        <a:xfrm>
+          <a:off x="0" y="0"/>
+          <a:ext cx="0" cy="0"/>
+          <a:chOff x="0" y="0"/>
+          <a:chExt cx="0" cy="0"/>
+        </a:xfrm>
+      </p:grpSpPr>
+      <p:sp>
+        <p:nvSpPr>
+          <p:cNvPr id="2" name="Title 1">
+            <a:extLst>
+              <a:ext uri="{FF2B5EF4-FFF2-40B4-BE49-F238E27FC236}">
+                <a16:creationId xmlns:a16="http://schemas.microsoft.com/office/drawing/2014/main" id="{06315F63-F577-5C35-5C6F-98E9314BE840}"/>
+              </a:ext>
+            </a:extLst>
+          </p:cNvPr>
+          <p:cNvSpPr>
+            <a:spLocks noGrp="1"/>
+          </p:cNvSpPr>
+          <p:nvPr>
+            <p:ph type="title"/>
+          </p:nvPr>
+        </p:nvSpPr>
+        <p:spPr/>
+        <p:txBody>
+          <a:bodyPr/>
+          <a:lstStyle/>
+          <a:p>
+            <a:r>
+              <a:rPr lang="en-US"/>
+              <a:t>Click to edit Master title style</a:t>
+            </a:r>
+          </a:p>
+        </p:txBody>
+      </p:sp>
+      <p:sp>
+        <p:nvSpPr>
+          <p:cNvPr id="3" name="Content Placeholder 2">
+            <a:extLst>
+              <a:ext uri="{FF2B5EF4-FFF2-40B4-BE49-F238E27FC236}">
+                <a16:creationId xmlns:a16="http://schemas.microsoft.com/office/drawing/2014/main" id="{E5CCD54F-A21E-6DC6-434A-B7C98A012700}"/>
+              </a:ext>
+            </a:extLst>
+          </p:cNvPr>
+          <p:cNvSpPr>
+            <a:spLocks noGrp="1"/>
+          </p:cNvSpPr>
+          <p:nvPr>
+            <p:ph idx="1"/>
+          </p:nvPr>
+        </p:nvSpPr>
+        <p:spPr/>
+        <p:txBody>
+          <a:bodyPr/>
+          <a:lstStyle/>
+          <a:p>
+            <a:pPr lvl="0"/>
+            <a:r>
+              <a:rPr lang="en-US"/>
+              <a:t>Click to edit Master text styles</a:t>
+            </a:r>
+          </a:p>
+          <a:p>
+            <a:pPr lvl="1"/>
+            <a:r>
+              <a:rPr lang="en-US"/>
+              <a:t>Second level</a:t>
+            </a:r>
+          </a:p>
+          <a:p>
+            <a:pPr lvl="2"/>
+            <a:r>
+              <a:rPr lang="en-US"/>
+              <a:t>Third level</a:t>
+            </a:r>
+          </a:p>
+          <a:p>
+            <a:pPr lvl="3"/>
+            <a:r>
+              <a:rPr lang="en-US"/>
+              <a:t>Fourth level</a:t>
+            </a:r>
+          </a:p>
+          <a:p>
+            <a:pPr lvl="4"/>
+            <a:r>
+              <a:rPr lang="en-US"/>
+              <a:t>Fifth level</a:t>
+            </a:r>
+          </a:p>
+        </p:txBody>
+      </p:sp>
+      <p:sp>
+        <p:nvSpPr>
+          <p:cNvPr id="4" name="Date Placeholder 3">
+            <a:extLst>
+              <a:ext uri="{FF2B5EF4-FFF2-40B4-BE49-F238E27FC236}">
+                <a16:creationId xmlns:a16="http://schemas.microsoft.com/office/drawing/2014/main" id="{8FD39609-25F5-DCE5-2C2F-284E7AAB31A0}"/>
+              </a:ext>
+            </a:extLst>
+          </p:cNvPr>
+          <p:cNvSpPr>
+            <a:spLocks noGrp="1"/>
+          </p:cNvSpPr>
+          <p:nvPr>
+            <p:ph type="dt" sz="half" idx="10"/>
+          </p:nvPr>
+        </p:nvSpPr>
+        <p:spPr/>
+        <p:txBody>
+          <a:bodyPr/>
+          <a:lstStyle/>
+          <a:p>
+            <a:fld id="{B0D8FE7D-1B7D-4F64-9A61-BC4E7F9D9BA8}" type="datetimeFigureOut">
+              <a:rPr lang="en-US" smtClean="0"/>
+              <a:t>11/21/2023</a:t>
+            </a:fld>
+            <a:endParaRPr lang="en-US"/>
+          </a:p>
+        </p:txBody>
+      </p:sp>
+      <p:sp>
+        <p:nvSpPr>
+          <p:cNvPr id="5" name="Footer Placeholder 4">
+            <a:extLst>
+              <a:ext uri="{FF2B5EF4-FFF2-40B4-BE49-F238E27FC236}">
+                <a16:creationId xmlns:a16="http://schemas.microsoft.com/office/drawing/2014/main" id="{41302615-CE9E-EAB2-EBDE-B5ED5BEC95AE}"/>
+              </a:ext>
+            </a:extLst>
+          </p:cNvPr>
+          <p:cNvSpPr>
+            <a:spLocks noGrp="1"/>
+          </p:cNvSpPr>
+          <p:nvPr>
+            <p:ph type="ftr" sz="quarter" idx="11"/>
+          </p:nvPr>
+        </p:nvSpPr>
+        <p:spPr/>
+        <p:txBody>
+          <a:bodyPr/>
+          <a:lstStyle/>
+          <a:p>
+            <a:endParaRPr lang="en-US"/>
+          </a:p>
+        </p:txBody>
+      </p:sp>
+      <p:sp>
+        <p:nvSpPr>
+          <p:cNvPr id="6" name="Slide Number Placeholder 5">
+            <a:extLst>
+              <a:ext uri="{FF2B5EF4-FFF2-40B4-BE49-F238E27FC236}">
+                <a16:creationId xmlns:a16="http://schemas.microsoft.com/office/drawing/2014/main" id="{FA0D5794-E3CE-2B36-9091-154BCD7A8140}"/>
+              </a:ext>
+            </a:extLst>
+          </p:cNvPr>
+          <p:cNvSpPr>
+            <a:spLocks noGrp="1"/>
+          </p:cNvSpPr>
+          <p:nvPr>
+            <p:ph type="sldNum" sz="quarter" idx="12"/>
+          </p:nvPr>
+        </p:nvSpPr>
+        <p:spPr/>
+        <p:txBody>
+          <a:bodyPr/>
+          <a:lstStyle/>
+          <a:p>
+            <a:fld id="{0A576EAE-BE0D-48C0-BC58-366ED3EB5064}" type="slidenum">
+              <a:rPr lang="en-US" smtClean="0"/>
+              <a:t>‹#›</a:t>
+            </a:fld>
+            <a:endParaRPr lang="en-US"/>
+          </a:p>
+        </p:txBody>
+      </p:sp>
+    </p:spTree>
+    <p:extLst>
+      <p:ext uri="{BB962C8B-B14F-4D97-AF65-F5344CB8AC3E}">
+        <p14:creationId xmlns:p14="http://schemas.microsoft.com/office/powerpoint/2010/main" val="1913599619"/>
+      </p:ext>
+    </p:extLst>
+  </p:cSld>
+  <p:clrMapOvr>
+    <a:masterClrMapping/>
+  </p:clrMapOvr>
+</p:sldLayout>
+</file>
+
 <file path=ppt/slideLayouts/slideLayout3.xml><?xml version="1.0" encoding="utf-8"?>
 <p:sldLayout xmlns:a="http://schemas.openxmlformats.org/drawingml/2006/main" xmlns:r="http://schemas.openxmlformats.org/officeDocument/2006/relationships" xmlns:p="http://schemas.openxmlformats.org/presentationml/2006/main" preserve="1">
   <p:cSld name="Cover Green - IQVIA">
@@ -26968,6 +27390,8 @@
     <p:sldLayoutId id="2147484258" r:id="rId25"/>
     <p:sldLayoutId id="2147484259" r:id="rId26"/>
     <p:sldLayoutId id="2147484260" r:id="rId27"/>
+    <p:sldLayoutId id="2147484262" r:id="rId28"/>
+    <p:sldLayoutId id="2147484263" r:id="rId29"/>
   </p:sldLayoutIdLst>
   <mc:AlternateContent xmlns:mc="http://schemas.openxmlformats.org/markup-compatibility/2006" xmlns:p14="http://schemas.microsoft.com/office/powerpoint/2010/main">
     <mc:Choice Requires="p14">
@@ -27396,6 +27820,797 @@
 </p:sld>
 </file>
 
+<file path=ppt/slides/slide10.xml><?xml version="1.0" encoding="utf-8"?>
+<p:sld xmlns:a="http://schemas.openxmlformats.org/drawingml/2006/main" xmlns:r="http://schemas.openxmlformats.org/officeDocument/2006/relationships" xmlns:p="http://schemas.openxmlformats.org/presentationml/2006/main">
+  <p:cSld>
+    <p:spTree>
+      <p:nvGrpSpPr>
+        <p:cNvPr id="1" name=""/>
+        <p:cNvGrpSpPr/>
+        <p:nvPr/>
+      </p:nvGrpSpPr>
+      <p:grpSpPr>
+        <a:xfrm>
+          <a:off x="0" y="0"/>
+          <a:ext cx="0" cy="0"/>
+          <a:chOff x="0" y="0"/>
+          <a:chExt cx="0" cy="0"/>
+        </a:xfrm>
+      </p:grpSpPr>
+      <p:pic>
+        <p:nvPicPr>
+          <p:cNvPr id="5" name="Picture 4" descr="A screenshot of a computer program&#10;&#10;Description automatically generated">
+            <a:extLst>
+              <a:ext uri="{FF2B5EF4-FFF2-40B4-BE49-F238E27FC236}">
+                <a16:creationId xmlns:a16="http://schemas.microsoft.com/office/drawing/2014/main" id="{7567922C-9DB8-176F-3019-C33C03F687CA}"/>
+              </a:ext>
+            </a:extLst>
+          </p:cNvPr>
+          <p:cNvPicPr>
+            <a:picLocks noChangeAspect="1"/>
+          </p:cNvPicPr>
+          <p:nvPr/>
+        </p:nvPicPr>
+        <p:blipFill>
+          <a:blip r:embed="rId2">
+            <a:extLst>
+              <a:ext uri="{28A0092B-C50C-407E-A947-70E740481C1C}">
+                <a14:useLocalDpi xmlns:a14="http://schemas.microsoft.com/office/drawing/2010/main" val="0"/>
+              </a:ext>
+            </a:extLst>
+          </a:blip>
+          <a:stretch>
+            <a:fillRect/>
+          </a:stretch>
+        </p:blipFill>
+        <p:spPr>
+          <a:xfrm>
+            <a:off x="148845" y="1660634"/>
+            <a:ext cx="11894310" cy="5171089"/>
+          </a:xfrm>
+          <a:prstGeom prst="rect">
+            <a:avLst/>
+          </a:prstGeom>
+        </p:spPr>
+      </p:pic>
+      <p:sp>
+        <p:nvSpPr>
+          <p:cNvPr id="6" name="TextBox 5">
+            <a:extLst>
+              <a:ext uri="{FF2B5EF4-FFF2-40B4-BE49-F238E27FC236}">
+                <a16:creationId xmlns:a16="http://schemas.microsoft.com/office/drawing/2014/main" id="{A2BACDD6-48E1-95AB-81E9-8B31E8DEC94E}"/>
+              </a:ext>
+            </a:extLst>
+          </p:cNvPr>
+          <p:cNvSpPr txBox="1"/>
+          <p:nvPr/>
+        </p:nvSpPr>
+        <p:spPr>
+          <a:xfrm flipH="1">
+            <a:off x="8491510" y="5281449"/>
+            <a:ext cx="3510451" cy="923330"/>
+          </a:xfrm>
+          <a:prstGeom prst="rect">
+            <a:avLst/>
+          </a:prstGeom>
+          <a:noFill/>
+        </p:spPr>
+        <p:txBody>
+          <a:bodyPr wrap="square" rtlCol="0">
+            <a:spAutoFit/>
+          </a:bodyPr>
+          <a:lstStyle/>
+          <a:p>
+            <a:r>
+              <a:rPr lang="en-US" dirty="0">
+                <a:solidFill>
+                  <a:schemeClr val="bg1"/>
+                </a:solidFill>
+              </a:rPr>
+              <a:t>GPT generated output – (PAF Code) in the correct format with unique and appropriate names and labels.</a:t>
+            </a:r>
+          </a:p>
+        </p:txBody>
+      </p:sp>
+      <p:cxnSp>
+        <p:nvCxnSpPr>
+          <p:cNvPr id="8" name="Straight Arrow Connector 7">
+            <a:extLst>
+              <a:ext uri="{FF2B5EF4-FFF2-40B4-BE49-F238E27FC236}">
+                <a16:creationId xmlns:a16="http://schemas.microsoft.com/office/drawing/2014/main" id="{8B90D0D4-246B-CFF0-A5FA-D8A29CAD8971}"/>
+              </a:ext>
+            </a:extLst>
+          </p:cNvPr>
+          <p:cNvCxnSpPr>
+            <a:cxnSpLocks/>
+          </p:cNvCxnSpPr>
+          <p:nvPr/>
+        </p:nvCxnSpPr>
+        <p:spPr>
+          <a:xfrm flipH="1">
+            <a:off x="7449292" y="5743114"/>
+            <a:ext cx="1042218" cy="0"/>
+          </a:xfrm>
+          <a:prstGeom prst="straightConnector1">
+            <a:avLst/>
+          </a:prstGeom>
+          <a:ln w="28575">
+            <a:tailEnd type="triangle"/>
+          </a:ln>
+        </p:spPr>
+        <p:style>
+          <a:lnRef idx="3">
+            <a:schemeClr val="accent1"/>
+          </a:lnRef>
+          <a:fillRef idx="0">
+            <a:schemeClr val="accent1"/>
+          </a:fillRef>
+          <a:effectRef idx="2">
+            <a:schemeClr val="accent1"/>
+          </a:effectRef>
+          <a:fontRef idx="minor">
+            <a:schemeClr val="tx1"/>
+          </a:fontRef>
+        </p:style>
+      </p:cxnSp>
+      <p:sp>
+        <p:nvSpPr>
+          <p:cNvPr id="12" name="TextBox 11">
+            <a:extLst>
+              <a:ext uri="{FF2B5EF4-FFF2-40B4-BE49-F238E27FC236}">
+                <a16:creationId xmlns:a16="http://schemas.microsoft.com/office/drawing/2014/main" id="{A3A7841A-C667-3ED5-60D1-0EA2B1BD9E2B}"/>
+              </a:ext>
+            </a:extLst>
+          </p:cNvPr>
+          <p:cNvSpPr txBox="1"/>
+          <p:nvPr/>
+        </p:nvSpPr>
+        <p:spPr>
+          <a:xfrm>
+            <a:off x="148845" y="147148"/>
+            <a:ext cx="11627146" cy="1200329"/>
+          </a:xfrm>
+          <a:prstGeom prst="rect">
+            <a:avLst/>
+          </a:prstGeom>
+          <a:noFill/>
+        </p:spPr>
+        <p:txBody>
+          <a:bodyPr wrap="square" rtlCol="0">
+            <a:spAutoFit/>
+          </a:bodyPr>
+          <a:lstStyle/>
+          <a:p>
+            <a:pPr marL="285750" indent="-285750">
+              <a:buFont typeface="Arial" panose="020B0604020202020204" pitchFamily="34" charset="0"/>
+              <a:buChar char="•"/>
+            </a:pPr>
+            <a:r>
+              <a:rPr lang="en-US" dirty="0"/>
+              <a:t>Here, GPT generates PAF code in the correct format referring to the user manual. It automatically generates unique and appropriate id’s, names, labels, etc., based on the context. </a:t>
+            </a:r>
+          </a:p>
+          <a:p>
+            <a:pPr marL="285750" indent="-285750">
+              <a:buFont typeface="Arial" panose="020B0604020202020204" pitchFamily="34" charset="0"/>
+              <a:buChar char="•"/>
+            </a:pPr>
+            <a:r>
+              <a:rPr lang="en-US" dirty="0"/>
+              <a:t>Here the input is a combination of UI locators and natural language input.</a:t>
+            </a:r>
+          </a:p>
+          <a:p>
+            <a:pPr marL="285750" indent="-285750">
+              <a:buFont typeface="Arial" panose="020B0604020202020204" pitchFamily="34" charset="0"/>
+              <a:buChar char="•"/>
+            </a:pPr>
+            <a:r>
+              <a:rPr lang="en-US" dirty="0"/>
+              <a:t>In the next slide, we can look at how we can automatically acquire the UI locators some of the natural language input.</a:t>
+            </a:r>
+          </a:p>
+        </p:txBody>
+      </p:sp>
+      <p:sp>
+        <p:nvSpPr>
+          <p:cNvPr id="15" name="TextBox 14">
+            <a:extLst>
+              <a:ext uri="{FF2B5EF4-FFF2-40B4-BE49-F238E27FC236}">
+                <a16:creationId xmlns:a16="http://schemas.microsoft.com/office/drawing/2014/main" id="{A7A1735A-1353-9E60-C07E-2E10455CE178}"/>
+              </a:ext>
+            </a:extLst>
+          </p:cNvPr>
+          <p:cNvSpPr txBox="1"/>
+          <p:nvPr/>
+        </p:nvSpPr>
+        <p:spPr>
+          <a:xfrm flipH="1">
+            <a:off x="8491510" y="1693528"/>
+            <a:ext cx="3384332" cy="584775"/>
+          </a:xfrm>
+          <a:prstGeom prst="rect">
+            <a:avLst/>
+          </a:prstGeom>
+          <a:noFill/>
+        </p:spPr>
+        <p:txBody>
+          <a:bodyPr wrap="square" rtlCol="0">
+            <a:spAutoFit/>
+          </a:bodyPr>
+          <a:lstStyle/>
+          <a:p>
+            <a:r>
+              <a:rPr lang="en-US" sz="1600" dirty="0">
+                <a:solidFill>
+                  <a:schemeClr val="bg1"/>
+                </a:solidFill>
+              </a:rPr>
+              <a:t>Some crude input consisting of UI locators and natural language.</a:t>
+            </a:r>
+          </a:p>
+        </p:txBody>
+      </p:sp>
+      <p:cxnSp>
+        <p:nvCxnSpPr>
+          <p:cNvPr id="17" name="Straight Arrow Connector 16">
+            <a:extLst>
+              <a:ext uri="{FF2B5EF4-FFF2-40B4-BE49-F238E27FC236}">
+                <a16:creationId xmlns:a16="http://schemas.microsoft.com/office/drawing/2014/main" id="{D890309A-1D1C-6C21-AE19-6DE0BF4D0679}"/>
+              </a:ext>
+            </a:extLst>
+          </p:cNvPr>
+          <p:cNvCxnSpPr>
+            <a:cxnSpLocks/>
+          </p:cNvCxnSpPr>
+          <p:nvPr/>
+        </p:nvCxnSpPr>
+        <p:spPr>
+          <a:xfrm>
+            <a:off x="9028386" y="2278303"/>
+            <a:ext cx="0" cy="383205"/>
+          </a:xfrm>
+          <a:prstGeom prst="straightConnector1">
+            <a:avLst/>
+          </a:prstGeom>
+          <a:ln w="38100">
+            <a:tailEnd type="triangle"/>
+          </a:ln>
+        </p:spPr>
+        <p:style>
+          <a:lnRef idx="1">
+            <a:schemeClr val="accent1"/>
+          </a:lnRef>
+          <a:fillRef idx="0">
+            <a:schemeClr val="accent1"/>
+          </a:fillRef>
+          <a:effectRef idx="0">
+            <a:schemeClr val="accent1"/>
+          </a:effectRef>
+          <a:fontRef idx="minor">
+            <a:schemeClr val="tx1"/>
+          </a:fontRef>
+        </p:style>
+      </p:cxnSp>
+    </p:spTree>
+    <p:extLst>
+      <p:ext uri="{BB962C8B-B14F-4D97-AF65-F5344CB8AC3E}">
+        <p14:creationId xmlns:p14="http://schemas.microsoft.com/office/powerpoint/2010/main" val="369037730"/>
+      </p:ext>
+    </p:extLst>
+  </p:cSld>
+  <p:clrMapOvr>
+    <a:masterClrMapping/>
+  </p:clrMapOvr>
+</p:sld>
+</file>
+
+<file path=ppt/slides/slide11.xml><?xml version="1.0" encoding="utf-8"?>
+<p:sld xmlns:a="http://schemas.openxmlformats.org/drawingml/2006/main" xmlns:r="http://schemas.openxmlformats.org/officeDocument/2006/relationships" xmlns:p="http://schemas.openxmlformats.org/presentationml/2006/main">
+  <p:cSld>
+    <p:spTree>
+      <p:nvGrpSpPr>
+        <p:cNvPr id="1" name=""/>
+        <p:cNvGrpSpPr/>
+        <p:nvPr/>
+      </p:nvGrpSpPr>
+      <p:grpSpPr>
+        <a:xfrm>
+          <a:off x="0" y="0"/>
+          <a:ext cx="0" cy="0"/>
+          <a:chOff x="0" y="0"/>
+          <a:chExt cx="0" cy="0"/>
+        </a:xfrm>
+      </p:grpSpPr>
+      <p:pic>
+        <p:nvPicPr>
+          <p:cNvPr id="5" name="Picture 4" descr="A screenshot of a computer&#10;&#10;Description automatically generated">
+            <a:extLst>
+              <a:ext uri="{FF2B5EF4-FFF2-40B4-BE49-F238E27FC236}">
+                <a16:creationId xmlns:a16="http://schemas.microsoft.com/office/drawing/2014/main" id="{A57F7950-4964-D546-4BE3-38019C7DC8CD}"/>
+              </a:ext>
+            </a:extLst>
+          </p:cNvPr>
+          <p:cNvPicPr>
+            <a:picLocks noChangeAspect="1"/>
+          </p:cNvPicPr>
+          <p:nvPr/>
+        </p:nvPicPr>
+        <p:blipFill rotWithShape="1">
+          <a:blip r:embed="rId2">
+            <a:extLst>
+              <a:ext uri="{28A0092B-C50C-407E-A947-70E740481C1C}">
+                <a14:useLocalDpi xmlns:a14="http://schemas.microsoft.com/office/drawing/2010/main" val="0"/>
+              </a:ext>
+            </a:extLst>
+          </a:blip>
+          <a:srcRect b="7296"/>
+          <a:stretch/>
+        </p:blipFill>
+        <p:spPr>
+          <a:xfrm>
+            <a:off x="333026" y="2328041"/>
+            <a:ext cx="11525948" cy="4540469"/>
+          </a:xfrm>
+          <a:prstGeom prst="rect">
+            <a:avLst/>
+          </a:prstGeom>
+        </p:spPr>
+      </p:pic>
+      <p:sp>
+        <p:nvSpPr>
+          <p:cNvPr id="6" name="TextBox 5">
+            <a:extLst>
+              <a:ext uri="{FF2B5EF4-FFF2-40B4-BE49-F238E27FC236}">
+                <a16:creationId xmlns:a16="http://schemas.microsoft.com/office/drawing/2014/main" id="{AA55B19B-C5FE-F91D-7415-CFBFD02579D3}"/>
+              </a:ext>
+            </a:extLst>
+          </p:cNvPr>
+          <p:cNvSpPr txBox="1"/>
+          <p:nvPr/>
+        </p:nvSpPr>
+        <p:spPr>
+          <a:xfrm>
+            <a:off x="7199363" y="4319753"/>
+            <a:ext cx="4736488" cy="1200329"/>
+          </a:xfrm>
+          <a:prstGeom prst="rect">
+            <a:avLst/>
+          </a:prstGeom>
+          <a:noFill/>
+        </p:spPr>
+        <p:txBody>
+          <a:bodyPr wrap="square" rtlCol="0">
+            <a:spAutoFit/>
+          </a:bodyPr>
+          <a:lstStyle/>
+          <a:p>
+            <a:r>
+              <a:rPr lang="en-US" dirty="0"/>
+              <a:t>This action recorder records the UI actions performed and captures the required UI locators sequentially as the tests are being manually performed (this is a one-time process).</a:t>
+            </a:r>
+          </a:p>
+        </p:txBody>
+      </p:sp>
+      <p:cxnSp>
+        <p:nvCxnSpPr>
+          <p:cNvPr id="8" name="Straight Arrow Connector 7">
+            <a:extLst>
+              <a:ext uri="{FF2B5EF4-FFF2-40B4-BE49-F238E27FC236}">
+                <a16:creationId xmlns:a16="http://schemas.microsoft.com/office/drawing/2014/main" id="{5C8FBDF8-896D-CB83-D133-E29974AFDBF4}"/>
+              </a:ext>
+            </a:extLst>
+          </p:cNvPr>
+          <p:cNvCxnSpPr/>
+          <p:nvPr/>
+        </p:nvCxnSpPr>
+        <p:spPr>
+          <a:xfrm flipH="1">
+            <a:off x="6011694" y="4919917"/>
+            <a:ext cx="1114097" cy="0"/>
+          </a:xfrm>
+          <a:prstGeom prst="straightConnector1">
+            <a:avLst/>
+          </a:prstGeom>
+          <a:ln w="38100">
+            <a:tailEnd type="triangle"/>
+          </a:ln>
+        </p:spPr>
+        <p:style>
+          <a:lnRef idx="1">
+            <a:schemeClr val="accent1"/>
+          </a:lnRef>
+          <a:fillRef idx="0">
+            <a:schemeClr val="accent1"/>
+          </a:fillRef>
+          <a:effectRef idx="0">
+            <a:schemeClr val="accent1"/>
+          </a:effectRef>
+          <a:fontRef idx="minor">
+            <a:schemeClr val="tx1"/>
+          </a:fontRef>
+        </p:style>
+      </p:cxnSp>
+      <p:sp>
+        <p:nvSpPr>
+          <p:cNvPr id="9" name="TextBox 8">
+            <a:extLst>
+              <a:ext uri="{FF2B5EF4-FFF2-40B4-BE49-F238E27FC236}">
+                <a16:creationId xmlns:a16="http://schemas.microsoft.com/office/drawing/2014/main" id="{3FC2AFD4-00EF-0F3E-9941-08FC885F976B}"/>
+              </a:ext>
+            </a:extLst>
+          </p:cNvPr>
+          <p:cNvSpPr txBox="1"/>
+          <p:nvPr/>
+        </p:nvSpPr>
+        <p:spPr>
+          <a:xfrm>
+            <a:off x="409903" y="357351"/>
+            <a:ext cx="11525948" cy="1754326"/>
+          </a:xfrm>
+          <a:prstGeom prst="rect">
+            <a:avLst/>
+          </a:prstGeom>
+          <a:noFill/>
+        </p:spPr>
+        <p:txBody>
+          <a:bodyPr wrap="square" rtlCol="0">
+            <a:spAutoFit/>
+          </a:bodyPr>
+          <a:lstStyle/>
+          <a:p>
+            <a:pPr marL="285750" indent="-285750">
+              <a:buFont typeface="Arial" panose="020B0604020202020204" pitchFamily="34" charset="0"/>
+              <a:buChar char="•"/>
+            </a:pPr>
+            <a:r>
+              <a:rPr lang="en-US" dirty="0"/>
+              <a:t>As a test is performed manually (just a single time is required) – the action recorder captures all the UI locators required in the correct order along with the action that is being performed and stores it. </a:t>
+            </a:r>
+          </a:p>
+          <a:p>
+            <a:pPr marL="285750" indent="-285750">
+              <a:buFont typeface="Arial" panose="020B0604020202020204" pitchFamily="34" charset="0"/>
+              <a:buChar char="•"/>
+            </a:pPr>
+            <a:r>
+              <a:rPr lang="en-US" dirty="0"/>
+              <a:t>This in turn can be fed as input to the GPT code generator to produce the required code.</a:t>
+            </a:r>
+          </a:p>
+          <a:p>
+            <a:pPr marL="285750" indent="-285750">
+              <a:buFont typeface="Arial" panose="020B0604020202020204" pitchFamily="34" charset="0"/>
+              <a:buChar char="•"/>
+            </a:pPr>
+            <a:r>
+              <a:rPr lang="en-US" dirty="0"/>
+              <a:t>Some complex actions though, cannot be simply captured – like validation, pass messages, checking calculations, comparing texts, etc.</a:t>
+            </a:r>
+          </a:p>
+          <a:p>
+            <a:pPr marL="285750" indent="-285750">
+              <a:buFont typeface="Arial" panose="020B0604020202020204" pitchFamily="34" charset="0"/>
+              <a:buChar char="•"/>
+            </a:pPr>
+            <a:r>
+              <a:rPr lang="en-US" dirty="0"/>
+              <a:t>This is where the natural language processing capabilities of GPT come into play </a:t>
+            </a:r>
+          </a:p>
+        </p:txBody>
+      </p:sp>
+    </p:spTree>
+    <p:extLst>
+      <p:ext uri="{BB962C8B-B14F-4D97-AF65-F5344CB8AC3E}">
+        <p14:creationId xmlns:p14="http://schemas.microsoft.com/office/powerpoint/2010/main" val="1745361772"/>
+      </p:ext>
+    </p:extLst>
+  </p:cSld>
+  <p:clrMapOvr>
+    <a:masterClrMapping/>
+  </p:clrMapOvr>
+</p:sld>
+</file>
+
+<file path=ppt/slides/slide12.xml><?xml version="1.0" encoding="utf-8"?>
+<p:sld xmlns:a="http://schemas.openxmlformats.org/drawingml/2006/main" xmlns:r="http://schemas.openxmlformats.org/officeDocument/2006/relationships" xmlns:p="http://schemas.openxmlformats.org/presentationml/2006/main">
+  <p:cSld>
+    <p:spTree>
+      <p:nvGrpSpPr>
+        <p:cNvPr id="1" name=""/>
+        <p:cNvGrpSpPr/>
+        <p:nvPr/>
+      </p:nvGrpSpPr>
+      <p:grpSpPr>
+        <a:xfrm>
+          <a:off x="0" y="0"/>
+          <a:ext cx="0" cy="0"/>
+          <a:chOff x="0" y="0"/>
+          <a:chExt cx="0" cy="0"/>
+        </a:xfrm>
+      </p:grpSpPr>
+      <p:pic>
+        <p:nvPicPr>
+          <p:cNvPr id="5" name="Picture 4" descr="A screenshot of a computer&#10;&#10;Description automatically generated">
+            <a:extLst>
+              <a:ext uri="{FF2B5EF4-FFF2-40B4-BE49-F238E27FC236}">
+                <a16:creationId xmlns:a16="http://schemas.microsoft.com/office/drawing/2014/main" id="{8721FB78-2680-07C1-60E5-23875B5889D2}"/>
+              </a:ext>
+            </a:extLst>
+          </p:cNvPr>
+          <p:cNvPicPr>
+            <a:picLocks noChangeAspect="1"/>
+          </p:cNvPicPr>
+          <p:nvPr/>
+        </p:nvPicPr>
+        <p:blipFill>
+          <a:blip r:embed="rId2">
+            <a:extLst>
+              <a:ext uri="{28A0092B-C50C-407E-A947-70E740481C1C}">
+                <a14:useLocalDpi xmlns:a14="http://schemas.microsoft.com/office/drawing/2010/main" val="0"/>
+              </a:ext>
+            </a:extLst>
+          </a:blip>
+          <a:stretch>
+            <a:fillRect/>
+          </a:stretch>
+        </p:blipFill>
+        <p:spPr>
+          <a:xfrm>
+            <a:off x="131381" y="1053802"/>
+            <a:ext cx="11929238" cy="5804198"/>
+          </a:xfrm>
+          <a:prstGeom prst="rect">
+            <a:avLst/>
+          </a:prstGeom>
+        </p:spPr>
+      </p:pic>
+      <p:cxnSp>
+        <p:nvCxnSpPr>
+          <p:cNvPr id="7" name="Straight Arrow Connector 6">
+            <a:extLst>
+              <a:ext uri="{FF2B5EF4-FFF2-40B4-BE49-F238E27FC236}">
+                <a16:creationId xmlns:a16="http://schemas.microsoft.com/office/drawing/2014/main" id="{6E4F251A-CA0F-6CEF-5F84-8D2696BA0929}"/>
+              </a:ext>
+            </a:extLst>
+          </p:cNvPr>
+          <p:cNvCxnSpPr>
+            <a:cxnSpLocks/>
+          </p:cNvCxnSpPr>
+          <p:nvPr/>
+        </p:nvCxnSpPr>
+        <p:spPr>
+          <a:xfrm>
+            <a:off x="4372303" y="935421"/>
+            <a:ext cx="0" cy="2493579"/>
+          </a:xfrm>
+          <a:prstGeom prst="straightConnector1">
+            <a:avLst/>
+          </a:prstGeom>
+          <a:ln w="57150">
+            <a:tailEnd type="triangle"/>
+          </a:ln>
+        </p:spPr>
+        <p:style>
+          <a:lnRef idx="1">
+            <a:schemeClr val="accent1"/>
+          </a:lnRef>
+          <a:fillRef idx="0">
+            <a:schemeClr val="accent1"/>
+          </a:fillRef>
+          <a:effectRef idx="0">
+            <a:schemeClr val="accent1"/>
+          </a:effectRef>
+          <a:fontRef idx="minor">
+            <a:schemeClr val="tx1"/>
+          </a:fontRef>
+        </p:style>
+      </p:cxnSp>
+      <p:sp>
+        <p:nvSpPr>
+          <p:cNvPr id="10" name="TextBox 9">
+            <a:extLst>
+              <a:ext uri="{FF2B5EF4-FFF2-40B4-BE49-F238E27FC236}">
+                <a16:creationId xmlns:a16="http://schemas.microsoft.com/office/drawing/2014/main" id="{9D0AE5E8-3DC6-E73E-391C-F25F56E6DE1F}"/>
+              </a:ext>
+            </a:extLst>
+          </p:cNvPr>
+          <p:cNvSpPr txBox="1"/>
+          <p:nvPr/>
+        </p:nvSpPr>
+        <p:spPr>
+          <a:xfrm>
+            <a:off x="294290" y="229899"/>
+            <a:ext cx="11603420" cy="646331"/>
+          </a:xfrm>
+          <a:prstGeom prst="rect">
+            <a:avLst/>
+          </a:prstGeom>
+          <a:noFill/>
+        </p:spPr>
+        <p:txBody>
+          <a:bodyPr wrap="square" rtlCol="0">
+            <a:spAutoFit/>
+          </a:bodyPr>
+          <a:lstStyle/>
+          <a:p>
+            <a:r>
+              <a:rPr lang="en-US" dirty="0"/>
+              <a:t>Here is a sample of some code generated by the action recorder alone – it generates the xpaths (UI locator), wait times, input values, in the correct order – this is crude PAF code.</a:t>
+            </a:r>
+          </a:p>
+        </p:txBody>
+      </p:sp>
+    </p:spTree>
+    <p:extLst>
+      <p:ext uri="{BB962C8B-B14F-4D97-AF65-F5344CB8AC3E}">
+        <p14:creationId xmlns:p14="http://schemas.microsoft.com/office/powerpoint/2010/main" val="1771763107"/>
+      </p:ext>
+    </p:extLst>
+  </p:cSld>
+  <p:clrMapOvr>
+    <a:masterClrMapping/>
+  </p:clrMapOvr>
+</p:sld>
+</file>
+
+<file path=ppt/slides/slide13.xml><?xml version="1.0" encoding="utf-8"?>
+<p:sld xmlns:a="http://schemas.openxmlformats.org/drawingml/2006/main" xmlns:r="http://schemas.openxmlformats.org/officeDocument/2006/relationships" xmlns:p="http://schemas.openxmlformats.org/presentationml/2006/main">
+  <p:cSld>
+    <p:spTree>
+      <p:nvGrpSpPr>
+        <p:cNvPr id="1" name=""/>
+        <p:cNvGrpSpPr/>
+        <p:nvPr/>
+      </p:nvGrpSpPr>
+      <p:grpSpPr>
+        <a:xfrm>
+          <a:off x="0" y="0"/>
+          <a:ext cx="0" cy="0"/>
+          <a:chOff x="0" y="0"/>
+          <a:chExt cx="0" cy="0"/>
+        </a:xfrm>
+      </p:grpSpPr>
+      <p:pic>
+        <p:nvPicPr>
+          <p:cNvPr id="5" name="Picture 4" descr="A screenshot of a computer&#10;&#10;Description automatically generated">
+            <a:extLst>
+              <a:ext uri="{FF2B5EF4-FFF2-40B4-BE49-F238E27FC236}">
+                <a16:creationId xmlns:a16="http://schemas.microsoft.com/office/drawing/2014/main" id="{7870DDC1-0DEE-BE72-D388-170A04AA57CF}"/>
+              </a:ext>
+            </a:extLst>
+          </p:cNvPr>
+          <p:cNvPicPr>
+            <a:picLocks noChangeAspect="1"/>
+          </p:cNvPicPr>
+          <p:nvPr/>
+        </p:nvPicPr>
+        <p:blipFill>
+          <a:blip r:embed="rId2">
+            <a:extLst>
+              <a:ext uri="{28A0092B-C50C-407E-A947-70E740481C1C}">
+                <a14:useLocalDpi xmlns:a14="http://schemas.microsoft.com/office/drawing/2010/main" val="0"/>
+              </a:ext>
+            </a:extLst>
+          </a:blip>
+          <a:stretch>
+            <a:fillRect/>
+          </a:stretch>
+        </p:blipFill>
+        <p:spPr>
+          <a:xfrm>
+            <a:off x="1329033" y="1684240"/>
+            <a:ext cx="10116733" cy="5165877"/>
+          </a:xfrm>
+          <a:prstGeom prst="rect">
+            <a:avLst/>
+          </a:prstGeom>
+        </p:spPr>
+      </p:pic>
+      <p:sp>
+        <p:nvSpPr>
+          <p:cNvPr id="6" name="TextBox 5">
+            <a:extLst>
+              <a:ext uri="{FF2B5EF4-FFF2-40B4-BE49-F238E27FC236}">
+                <a16:creationId xmlns:a16="http://schemas.microsoft.com/office/drawing/2014/main" id="{F4B9164D-96E9-05FE-932F-FEA4BCAD7204}"/>
+              </a:ext>
+            </a:extLst>
+          </p:cNvPr>
+          <p:cNvSpPr txBox="1"/>
+          <p:nvPr/>
+        </p:nvSpPr>
+        <p:spPr>
+          <a:xfrm>
+            <a:off x="916764" y="206912"/>
+            <a:ext cx="10941269" cy="1477328"/>
+          </a:xfrm>
+          <a:prstGeom prst="rect">
+            <a:avLst/>
+          </a:prstGeom>
+          <a:noFill/>
+        </p:spPr>
+        <p:txBody>
+          <a:bodyPr wrap="square" rtlCol="0">
+            <a:spAutoFit/>
+          </a:bodyPr>
+          <a:lstStyle/>
+          <a:p>
+            <a:pPr marL="285750" indent="-285750">
+              <a:buFont typeface="Arial" panose="020B0604020202020204" pitchFamily="34" charset="0"/>
+              <a:buChar char="•"/>
+            </a:pPr>
+            <a:r>
+              <a:rPr lang="en-US" dirty="0"/>
+              <a:t>These are the test steps performed manually and written down by reviewers which are passed down to the PAF code developers . </a:t>
+            </a:r>
+          </a:p>
+          <a:p>
+            <a:pPr marL="285750" indent="-285750">
+              <a:buFont typeface="Arial" panose="020B0604020202020204" pitchFamily="34" charset="0"/>
+              <a:buChar char="•"/>
+            </a:pPr>
+            <a:r>
+              <a:rPr lang="en-US" dirty="0"/>
+              <a:t>This process can be cut short by simply taking the actions the reviewer performs to conduct the test manually in conjunction with the test steps written by them to directly generate PAF script (or possibly, other custom framework code as well).</a:t>
+            </a:r>
+          </a:p>
+        </p:txBody>
+      </p:sp>
+      <p:cxnSp>
+        <p:nvCxnSpPr>
+          <p:cNvPr id="8" name="Straight Arrow Connector 7">
+            <a:extLst>
+              <a:ext uri="{FF2B5EF4-FFF2-40B4-BE49-F238E27FC236}">
+                <a16:creationId xmlns:a16="http://schemas.microsoft.com/office/drawing/2014/main" id="{62CFA9B2-7AD9-6F43-B76B-111D7376329E}"/>
+              </a:ext>
+            </a:extLst>
+          </p:cNvPr>
+          <p:cNvCxnSpPr>
+            <a:cxnSpLocks/>
+          </p:cNvCxnSpPr>
+          <p:nvPr/>
+        </p:nvCxnSpPr>
+        <p:spPr>
+          <a:xfrm>
+            <a:off x="5822731" y="1566041"/>
+            <a:ext cx="0" cy="2701137"/>
+          </a:xfrm>
+          <a:prstGeom prst="straightConnector1">
+            <a:avLst/>
+          </a:prstGeom>
+          <a:ln w="57150">
+            <a:tailEnd type="triangle"/>
+          </a:ln>
+        </p:spPr>
+        <p:style>
+          <a:lnRef idx="1">
+            <a:schemeClr val="accent1"/>
+          </a:lnRef>
+          <a:fillRef idx="0">
+            <a:schemeClr val="accent1"/>
+          </a:fillRef>
+          <a:effectRef idx="0">
+            <a:schemeClr val="accent1"/>
+          </a:effectRef>
+          <a:fontRef idx="minor">
+            <a:schemeClr val="tx1"/>
+          </a:fontRef>
+        </p:style>
+      </p:cxnSp>
+    </p:spTree>
+    <p:extLst>
+      <p:ext uri="{BB962C8B-B14F-4D97-AF65-F5344CB8AC3E}">
+        <p14:creationId xmlns:p14="http://schemas.microsoft.com/office/powerpoint/2010/main" val="2983097374"/>
+      </p:ext>
+    </p:extLst>
+  </p:cSld>
+  <p:clrMapOvr>
+    <a:masterClrMapping/>
+  </p:clrMapOvr>
+</p:sld>
+</file>
+
 <file path=ppt/slides/slide2.xml><?xml version="1.0" encoding="utf-8"?>
 <p:sld xmlns:a="http://schemas.openxmlformats.org/drawingml/2006/main" xmlns:r="http://schemas.openxmlformats.org/officeDocument/2006/relationships" xmlns:p="http://schemas.openxmlformats.org/presentationml/2006/main">
   <p:cSld>
@@ -27776,6 +28991,385 @@
 </file>
 
 <file path=ppt/slides/slide3.xml><?xml version="1.0" encoding="utf-8"?>
+<p:sld xmlns:a="http://schemas.openxmlformats.org/drawingml/2006/main" xmlns:r="http://schemas.openxmlformats.org/officeDocument/2006/relationships" xmlns:p="http://schemas.openxmlformats.org/presentationml/2006/main">
+  <p:cSld>
+    <p:spTree>
+      <p:nvGrpSpPr>
+        <p:cNvPr id="1" name=""/>
+        <p:cNvGrpSpPr/>
+        <p:nvPr/>
+      </p:nvGrpSpPr>
+      <p:grpSpPr>
+        <a:xfrm>
+          <a:off x="0" y="0"/>
+          <a:ext cx="0" cy="0"/>
+          <a:chOff x="0" y="0"/>
+          <a:chExt cx="0" cy="0"/>
+        </a:xfrm>
+      </p:grpSpPr>
+      <p:sp>
+        <p:nvSpPr>
+          <p:cNvPr id="2" name="Content Placeholder 1">
+            <a:extLst>
+              <a:ext uri="{FF2B5EF4-FFF2-40B4-BE49-F238E27FC236}">
+                <a16:creationId xmlns:a16="http://schemas.microsoft.com/office/drawing/2014/main" id="{38BC4056-4008-6BA8-959A-32B1C2BCFCA1}"/>
+              </a:ext>
+            </a:extLst>
+          </p:cNvPr>
+          <p:cNvSpPr>
+            <a:spLocks noGrp="1"/>
+          </p:cNvSpPr>
+          <p:nvPr>
+            <p:ph idx="1"/>
+          </p:nvPr>
+        </p:nvSpPr>
+        <p:spPr>
+          <a:xfrm>
+            <a:off x="683860" y="2242688"/>
+            <a:ext cx="5412139" cy="3465094"/>
+          </a:xfrm>
+        </p:spPr>
+        <p:txBody>
+          <a:bodyPr/>
+          <a:lstStyle/>
+          <a:p>
+            <a:r>
+              <a:rPr lang="en-US" dirty="0"/>
+              <a:t>A reviewer conducts the test to be performed manually. </a:t>
+            </a:r>
+          </a:p>
+          <a:p>
+            <a:r>
+              <a:rPr lang="en-US" dirty="0"/>
+              <a:t>They then document the steps to be replicated and pass it on to the PAF developers.</a:t>
+            </a:r>
+          </a:p>
+          <a:p>
+            <a:r>
+              <a:rPr lang="en-US" dirty="0"/>
+              <a:t>The PAF developers create the respective PAF script that correspond to the steps written by the reviewers</a:t>
+            </a:r>
+          </a:p>
+        </p:txBody>
+      </p:sp>
+      <p:sp>
+        <p:nvSpPr>
+          <p:cNvPr id="3" name="Title 2">
+            <a:extLst>
+              <a:ext uri="{FF2B5EF4-FFF2-40B4-BE49-F238E27FC236}">
+                <a16:creationId xmlns:a16="http://schemas.microsoft.com/office/drawing/2014/main" id="{995D6B50-1C01-891F-C07B-F52F62948FF3}"/>
+              </a:ext>
+            </a:extLst>
+          </p:cNvPr>
+          <p:cNvSpPr>
+            <a:spLocks noGrp="1"/>
+          </p:cNvSpPr>
+          <p:nvPr>
+            <p:ph type="title"/>
+          </p:nvPr>
+        </p:nvSpPr>
+        <p:spPr>
+          <a:xfrm>
+            <a:off x="7007189" y="1323692"/>
+            <a:ext cx="4176897" cy="594360"/>
+          </a:xfrm>
+        </p:spPr>
+        <p:txBody>
+          <a:bodyPr/>
+          <a:lstStyle/>
+          <a:p>
+            <a:r>
+              <a:rPr lang="en-US" sz="2800" dirty="0"/>
+              <a:t>Proposed methodology</a:t>
+            </a:r>
+          </a:p>
+        </p:txBody>
+      </p:sp>
+      <p:sp>
+        <p:nvSpPr>
+          <p:cNvPr id="4" name="Title 2">
+            <a:extLst>
+              <a:ext uri="{FF2B5EF4-FFF2-40B4-BE49-F238E27FC236}">
+                <a16:creationId xmlns:a16="http://schemas.microsoft.com/office/drawing/2014/main" id="{2C892E00-F5E9-59FF-857D-9D44385975E9}"/>
+              </a:ext>
+            </a:extLst>
+          </p:cNvPr>
+          <p:cNvSpPr txBox="1">
+            <a:spLocks/>
+          </p:cNvSpPr>
+          <p:nvPr/>
+        </p:nvSpPr>
+        <p:spPr>
+          <a:xfrm>
+            <a:off x="1343993" y="1323692"/>
+            <a:ext cx="4091874" cy="594360"/>
+          </a:xfrm>
+          <a:prstGeom prst="rect">
+            <a:avLst/>
+          </a:prstGeom>
+        </p:spPr>
+        <p:txBody>
+          <a:bodyPr anchor="ctr"/>
+          <a:lstStyle>
+            <a:lvl1pPr algn="l" defTabSz="914400" rtl="0" eaLnBrk="1" latinLnBrk="0" hangingPunct="1">
+              <a:lnSpc>
+                <a:spcPct val="90000"/>
+              </a:lnSpc>
+              <a:spcBef>
+                <a:spcPct val="0"/>
+              </a:spcBef>
+              <a:buNone/>
+              <a:defRPr sz="3200" b="1" kern="1200">
+                <a:solidFill>
+                  <a:schemeClr val="accent1"/>
+                </a:solidFill>
+                <a:latin typeface="+mj-lt"/>
+                <a:ea typeface="+mj-ea"/>
+                <a:cs typeface="+mj-cs"/>
+              </a:defRPr>
+            </a:lvl1pPr>
+          </a:lstStyle>
+          <a:p>
+            <a:r>
+              <a:rPr lang="en-US" sz="2800" dirty="0"/>
+              <a:t>Existing methodology</a:t>
+            </a:r>
+          </a:p>
+        </p:txBody>
+      </p:sp>
+      <p:sp>
+        <p:nvSpPr>
+          <p:cNvPr id="5" name="Content Placeholder 1">
+            <a:extLst>
+              <a:ext uri="{FF2B5EF4-FFF2-40B4-BE49-F238E27FC236}">
+                <a16:creationId xmlns:a16="http://schemas.microsoft.com/office/drawing/2014/main" id="{D6CAB40C-6A04-6C9E-F4C4-83EE19412047}"/>
+              </a:ext>
+            </a:extLst>
+          </p:cNvPr>
+          <p:cNvSpPr txBox="1">
+            <a:spLocks/>
+          </p:cNvSpPr>
+          <p:nvPr/>
+        </p:nvSpPr>
+        <p:spPr>
+          <a:xfrm>
+            <a:off x="6389567" y="2242688"/>
+            <a:ext cx="5412139" cy="3465094"/>
+          </a:xfrm>
+          <a:prstGeom prst="rect">
+            <a:avLst/>
+          </a:prstGeom>
+        </p:spPr>
+        <p:txBody>
+          <a:bodyPr/>
+          <a:lstStyle>
+            <a:lvl1pPr marL="182880" indent="-182880" algn="l" defTabSz="914400" rtl="0" eaLnBrk="1" latinLnBrk="0" hangingPunct="1">
+              <a:lnSpc>
+                <a:spcPct val="100000"/>
+              </a:lnSpc>
+              <a:spcBef>
+                <a:spcPts val="2000"/>
+              </a:spcBef>
+              <a:buClr>
+                <a:schemeClr val="accent1"/>
+              </a:buClr>
+              <a:buFont typeface="System Font Regular"/>
+              <a:buChar char="+"/>
+              <a:defRPr sz="1800" kern="1200">
+                <a:solidFill>
+                  <a:schemeClr val="tx1"/>
+                </a:solidFill>
+                <a:latin typeface="+mn-lt"/>
+                <a:ea typeface="+mn-ea"/>
+                <a:cs typeface="+mn-cs"/>
+              </a:defRPr>
+            </a:lvl1pPr>
+            <a:lvl2pPr marL="365760" indent="-182880" algn="l" defTabSz="914400" rtl="0" eaLnBrk="1" latinLnBrk="0" hangingPunct="1">
+              <a:lnSpc>
+                <a:spcPct val="100000"/>
+              </a:lnSpc>
+              <a:spcBef>
+                <a:spcPts val="800"/>
+              </a:spcBef>
+              <a:buClr>
+                <a:schemeClr val="tx1"/>
+              </a:buClr>
+              <a:buFont typeface="Arial" panose="020B0604020202020204" pitchFamily="34" charset="0"/>
+              <a:buChar char="•"/>
+              <a:defRPr sz="1600" kern="1200">
+                <a:solidFill>
+                  <a:schemeClr val="tx1"/>
+                </a:solidFill>
+                <a:latin typeface="+mn-lt"/>
+                <a:ea typeface="+mn-ea"/>
+                <a:cs typeface="+mn-cs"/>
+              </a:defRPr>
+            </a:lvl2pPr>
+            <a:lvl3pPr marL="548640" indent="-182880" algn="l" defTabSz="914400" rtl="0" eaLnBrk="1" latinLnBrk="0" hangingPunct="1">
+              <a:lnSpc>
+                <a:spcPct val="100000"/>
+              </a:lnSpc>
+              <a:spcBef>
+                <a:spcPts val="800"/>
+              </a:spcBef>
+              <a:buClrTx/>
+              <a:buFont typeface="Arial" panose="020B0604020202020204" pitchFamily="34" charset="0"/>
+              <a:buChar char="›"/>
+              <a:defRPr sz="1600" kern="1200">
+                <a:solidFill>
+                  <a:schemeClr val="tx1"/>
+                </a:solidFill>
+                <a:latin typeface="+mn-lt"/>
+                <a:ea typeface="+mn-ea"/>
+                <a:cs typeface="+mn-cs"/>
+              </a:defRPr>
+            </a:lvl3pPr>
+            <a:lvl4pPr marL="731520" indent="-182880" algn="l" defTabSz="914400" rtl="0" eaLnBrk="1" latinLnBrk="0" hangingPunct="1">
+              <a:lnSpc>
+                <a:spcPct val="100000"/>
+              </a:lnSpc>
+              <a:spcBef>
+                <a:spcPts val="800"/>
+              </a:spcBef>
+              <a:buClrTx/>
+              <a:buFont typeface="Arial" panose="020B0604020202020204" pitchFamily="34" charset="0"/>
+              <a:buChar char="»"/>
+              <a:defRPr sz="1600" kern="1200">
+                <a:solidFill>
+                  <a:schemeClr val="tx1"/>
+                </a:solidFill>
+                <a:latin typeface="+mn-lt"/>
+                <a:ea typeface="+mn-ea"/>
+                <a:cs typeface="+mn-cs"/>
+              </a:defRPr>
+            </a:lvl4pPr>
+            <a:lvl5pPr marL="914400" indent="-182880" algn="l" defTabSz="914400" rtl="0" eaLnBrk="1" latinLnBrk="0" hangingPunct="1">
+              <a:lnSpc>
+                <a:spcPct val="100000"/>
+              </a:lnSpc>
+              <a:spcBef>
+                <a:spcPts val="800"/>
+              </a:spcBef>
+              <a:buClrTx/>
+              <a:buSzPct val="75000"/>
+              <a:buFont typeface="Wingdings" panose="05000000000000000000" pitchFamily="2" charset="2"/>
+              <a:buChar char="§"/>
+              <a:defRPr sz="1600" kern="1200">
+                <a:solidFill>
+                  <a:schemeClr val="tx1"/>
+                </a:solidFill>
+                <a:latin typeface="+mn-lt"/>
+                <a:ea typeface="+mn-ea"/>
+                <a:cs typeface="+mn-cs"/>
+              </a:defRPr>
+            </a:lvl5pPr>
+            <a:lvl6pPr marL="2514600" indent="-228600" algn="l" defTabSz="914400" rtl="0" eaLnBrk="1" latinLnBrk="0" hangingPunct="1">
+              <a:lnSpc>
+                <a:spcPct val="90000"/>
+              </a:lnSpc>
+              <a:spcBef>
+                <a:spcPts val="500"/>
+              </a:spcBef>
+              <a:buFont typeface="Arial" panose="020B0604020202020204" pitchFamily="34" charset="0"/>
+              <a:buChar char="•"/>
+              <a:defRPr sz="1800" kern="1200">
+                <a:solidFill>
+                  <a:schemeClr val="tx1"/>
+                </a:solidFill>
+                <a:latin typeface="+mn-lt"/>
+                <a:ea typeface="+mn-ea"/>
+                <a:cs typeface="+mn-cs"/>
+              </a:defRPr>
+            </a:lvl6pPr>
+            <a:lvl7pPr marL="2971800" indent="-228600" algn="l" defTabSz="914400" rtl="0" eaLnBrk="1" latinLnBrk="0" hangingPunct="1">
+              <a:lnSpc>
+                <a:spcPct val="90000"/>
+              </a:lnSpc>
+              <a:spcBef>
+                <a:spcPts val="500"/>
+              </a:spcBef>
+              <a:buFont typeface="Arial" panose="020B0604020202020204" pitchFamily="34" charset="0"/>
+              <a:buChar char="•"/>
+              <a:defRPr sz="1800" kern="1200">
+                <a:solidFill>
+                  <a:schemeClr val="tx1"/>
+                </a:solidFill>
+                <a:latin typeface="+mn-lt"/>
+                <a:ea typeface="+mn-ea"/>
+                <a:cs typeface="+mn-cs"/>
+              </a:defRPr>
+            </a:lvl7pPr>
+            <a:lvl8pPr marL="3429000" indent="-228600" algn="l" defTabSz="914400" rtl="0" eaLnBrk="1" latinLnBrk="0" hangingPunct="1">
+              <a:lnSpc>
+                <a:spcPct val="90000"/>
+              </a:lnSpc>
+              <a:spcBef>
+                <a:spcPts val="500"/>
+              </a:spcBef>
+              <a:buFont typeface="Arial" panose="020B0604020202020204" pitchFamily="34" charset="0"/>
+              <a:buChar char="•"/>
+              <a:defRPr sz="1800" kern="1200">
+                <a:solidFill>
+                  <a:schemeClr val="tx1"/>
+                </a:solidFill>
+                <a:latin typeface="+mn-lt"/>
+                <a:ea typeface="+mn-ea"/>
+                <a:cs typeface="+mn-cs"/>
+              </a:defRPr>
+            </a:lvl8pPr>
+            <a:lvl9pPr marL="3886200" indent="-228600" algn="l" defTabSz="914400" rtl="0" eaLnBrk="1" latinLnBrk="0" hangingPunct="1">
+              <a:lnSpc>
+                <a:spcPct val="90000"/>
+              </a:lnSpc>
+              <a:spcBef>
+                <a:spcPts val="500"/>
+              </a:spcBef>
+              <a:buFont typeface="Arial" panose="020B0604020202020204" pitchFamily="34" charset="0"/>
+              <a:buChar char="•"/>
+              <a:defRPr sz="1800" kern="1200">
+                <a:solidFill>
+                  <a:schemeClr val="tx1"/>
+                </a:solidFill>
+                <a:latin typeface="+mn-lt"/>
+                <a:ea typeface="+mn-ea"/>
+                <a:cs typeface="+mn-cs"/>
+              </a:defRPr>
+            </a:lvl9pPr>
+          </a:lstStyle>
+          <a:p>
+            <a:r>
+              <a:rPr lang="en-US" dirty="0"/>
+              <a:t>While the reviewer conducts the manual tests and documents their steps – PlaybackGPT will capture these inputs and convert them into code directly.</a:t>
+            </a:r>
+          </a:p>
+        </p:txBody>
+      </p:sp>
+    </p:spTree>
+    <p:extLst>
+      <p:ext uri="{BB962C8B-B14F-4D97-AF65-F5344CB8AC3E}">
+        <p14:creationId xmlns:p14="http://schemas.microsoft.com/office/powerpoint/2010/main" val="1127949601"/>
+      </p:ext>
+    </p:extLst>
+  </p:cSld>
+  <p:clrMapOvr>
+    <a:masterClrMapping/>
+  </p:clrMapOvr>
+  <mc:AlternateContent xmlns:mc="http://schemas.openxmlformats.org/markup-compatibility/2006" xmlns:p14="http://schemas.microsoft.com/office/powerpoint/2010/main">
+    <mc:Choice Requires="p14">
+      <p:transition spd="med" p14:dur="700">
+        <p:fade/>
+      </p:transition>
+    </mc:Choice>
+    <mc:Fallback xmlns="">
+      <p:transition spd="med">
+        <p:fade/>
+      </p:transition>
+    </mc:Fallback>
+  </mc:AlternateContent>
+</p:sld>
+</file>
+
+<file path=ppt/slides/slide4.xml><?xml version="1.0" encoding="utf-8"?>
 <p:sld xmlns:a="http://schemas.openxmlformats.org/drawingml/2006/main" xmlns:r="http://schemas.openxmlformats.org/officeDocument/2006/relationships" xmlns:p="http://schemas.openxmlformats.org/presentationml/2006/main">
   <p:cSld>
     <p:spTree>
@@ -28721,7 +30315,7 @@
 </p:sld>
 </file>
 
-<file path=ppt/slides/slide4.xml><?xml version="1.0" encoding="utf-8"?>
+<file path=ppt/slides/slide5.xml><?xml version="1.0" encoding="utf-8"?>
 <p:sld xmlns:a="http://schemas.openxmlformats.org/drawingml/2006/main" xmlns:r="http://schemas.openxmlformats.org/officeDocument/2006/relationships" xmlns:p="http://schemas.openxmlformats.org/presentationml/2006/main">
   <p:cSld>
     <p:spTree>
@@ -28919,385 +30513,6 @@
     <p:extLst>
       <p:ext uri="{BB962C8B-B14F-4D97-AF65-F5344CB8AC3E}">
         <p14:creationId xmlns:p14="http://schemas.microsoft.com/office/powerpoint/2010/main" val="1497733689"/>
-      </p:ext>
-    </p:extLst>
-  </p:cSld>
-  <p:clrMapOvr>
-    <a:masterClrMapping/>
-  </p:clrMapOvr>
-  <mc:AlternateContent xmlns:mc="http://schemas.openxmlformats.org/markup-compatibility/2006" xmlns:p14="http://schemas.microsoft.com/office/powerpoint/2010/main">
-    <mc:Choice Requires="p14">
-      <p:transition spd="med" p14:dur="700">
-        <p:fade/>
-      </p:transition>
-    </mc:Choice>
-    <mc:Fallback xmlns="">
-      <p:transition spd="med">
-        <p:fade/>
-      </p:transition>
-    </mc:Fallback>
-  </mc:AlternateContent>
-</p:sld>
-</file>
-
-<file path=ppt/slides/slide5.xml><?xml version="1.0" encoding="utf-8"?>
-<p:sld xmlns:a="http://schemas.openxmlformats.org/drawingml/2006/main" xmlns:r="http://schemas.openxmlformats.org/officeDocument/2006/relationships" xmlns:p="http://schemas.openxmlformats.org/presentationml/2006/main">
-  <p:cSld>
-    <p:spTree>
-      <p:nvGrpSpPr>
-        <p:cNvPr id="1" name=""/>
-        <p:cNvGrpSpPr/>
-        <p:nvPr/>
-      </p:nvGrpSpPr>
-      <p:grpSpPr>
-        <a:xfrm>
-          <a:off x="0" y="0"/>
-          <a:ext cx="0" cy="0"/>
-          <a:chOff x="0" y="0"/>
-          <a:chExt cx="0" cy="0"/>
-        </a:xfrm>
-      </p:grpSpPr>
-      <p:sp>
-        <p:nvSpPr>
-          <p:cNvPr id="2" name="Content Placeholder 1">
-            <a:extLst>
-              <a:ext uri="{FF2B5EF4-FFF2-40B4-BE49-F238E27FC236}">
-                <a16:creationId xmlns:a16="http://schemas.microsoft.com/office/drawing/2014/main" id="{38BC4056-4008-6BA8-959A-32B1C2BCFCA1}"/>
-              </a:ext>
-            </a:extLst>
-          </p:cNvPr>
-          <p:cNvSpPr>
-            <a:spLocks noGrp="1"/>
-          </p:cNvSpPr>
-          <p:nvPr>
-            <p:ph idx="1"/>
-          </p:nvPr>
-        </p:nvSpPr>
-        <p:spPr>
-          <a:xfrm>
-            <a:off x="683860" y="2242688"/>
-            <a:ext cx="5412139" cy="3465094"/>
-          </a:xfrm>
-        </p:spPr>
-        <p:txBody>
-          <a:bodyPr/>
-          <a:lstStyle/>
-          <a:p>
-            <a:r>
-              <a:rPr lang="en-US" dirty="0"/>
-              <a:t>A reviewer conducts the test to be performed manually. </a:t>
-            </a:r>
-          </a:p>
-          <a:p>
-            <a:r>
-              <a:rPr lang="en-US" dirty="0"/>
-              <a:t>They then document the steps to be replicated and pass it on to the PAF developers.</a:t>
-            </a:r>
-          </a:p>
-          <a:p>
-            <a:r>
-              <a:rPr lang="en-US" dirty="0"/>
-              <a:t>The PAF developers create the respective PAF script that correspond to the steps written by the reviewers</a:t>
-            </a:r>
-          </a:p>
-        </p:txBody>
-      </p:sp>
-      <p:sp>
-        <p:nvSpPr>
-          <p:cNvPr id="3" name="Title 2">
-            <a:extLst>
-              <a:ext uri="{FF2B5EF4-FFF2-40B4-BE49-F238E27FC236}">
-                <a16:creationId xmlns:a16="http://schemas.microsoft.com/office/drawing/2014/main" id="{995D6B50-1C01-891F-C07B-F52F62948FF3}"/>
-              </a:ext>
-            </a:extLst>
-          </p:cNvPr>
-          <p:cNvSpPr>
-            <a:spLocks noGrp="1"/>
-          </p:cNvSpPr>
-          <p:nvPr>
-            <p:ph type="title"/>
-          </p:nvPr>
-        </p:nvSpPr>
-        <p:spPr>
-          <a:xfrm>
-            <a:off x="7007189" y="1323692"/>
-            <a:ext cx="4176897" cy="594360"/>
-          </a:xfrm>
-        </p:spPr>
-        <p:txBody>
-          <a:bodyPr/>
-          <a:lstStyle/>
-          <a:p>
-            <a:r>
-              <a:rPr lang="en-US" sz="2800" dirty="0"/>
-              <a:t>Proposed methodology</a:t>
-            </a:r>
-          </a:p>
-        </p:txBody>
-      </p:sp>
-      <p:sp>
-        <p:nvSpPr>
-          <p:cNvPr id="4" name="Title 2">
-            <a:extLst>
-              <a:ext uri="{FF2B5EF4-FFF2-40B4-BE49-F238E27FC236}">
-                <a16:creationId xmlns:a16="http://schemas.microsoft.com/office/drawing/2014/main" id="{2C892E00-F5E9-59FF-857D-9D44385975E9}"/>
-              </a:ext>
-            </a:extLst>
-          </p:cNvPr>
-          <p:cNvSpPr txBox="1">
-            <a:spLocks/>
-          </p:cNvSpPr>
-          <p:nvPr/>
-        </p:nvSpPr>
-        <p:spPr>
-          <a:xfrm>
-            <a:off x="1343993" y="1323692"/>
-            <a:ext cx="4091874" cy="594360"/>
-          </a:xfrm>
-          <a:prstGeom prst="rect">
-            <a:avLst/>
-          </a:prstGeom>
-        </p:spPr>
-        <p:txBody>
-          <a:bodyPr anchor="ctr"/>
-          <a:lstStyle>
-            <a:lvl1pPr algn="l" defTabSz="914400" rtl="0" eaLnBrk="1" latinLnBrk="0" hangingPunct="1">
-              <a:lnSpc>
-                <a:spcPct val="90000"/>
-              </a:lnSpc>
-              <a:spcBef>
-                <a:spcPct val="0"/>
-              </a:spcBef>
-              <a:buNone/>
-              <a:defRPr sz="3200" b="1" kern="1200">
-                <a:solidFill>
-                  <a:schemeClr val="accent1"/>
-                </a:solidFill>
-                <a:latin typeface="+mj-lt"/>
-                <a:ea typeface="+mj-ea"/>
-                <a:cs typeface="+mj-cs"/>
-              </a:defRPr>
-            </a:lvl1pPr>
-          </a:lstStyle>
-          <a:p>
-            <a:r>
-              <a:rPr lang="en-US" sz="2800" dirty="0"/>
-              <a:t>Existing methodology</a:t>
-            </a:r>
-          </a:p>
-        </p:txBody>
-      </p:sp>
-      <p:sp>
-        <p:nvSpPr>
-          <p:cNvPr id="5" name="Content Placeholder 1">
-            <a:extLst>
-              <a:ext uri="{FF2B5EF4-FFF2-40B4-BE49-F238E27FC236}">
-                <a16:creationId xmlns:a16="http://schemas.microsoft.com/office/drawing/2014/main" id="{D6CAB40C-6A04-6C9E-F4C4-83EE19412047}"/>
-              </a:ext>
-            </a:extLst>
-          </p:cNvPr>
-          <p:cNvSpPr txBox="1">
-            <a:spLocks/>
-          </p:cNvSpPr>
-          <p:nvPr/>
-        </p:nvSpPr>
-        <p:spPr>
-          <a:xfrm>
-            <a:off x="6389567" y="2242688"/>
-            <a:ext cx="5412139" cy="3465094"/>
-          </a:xfrm>
-          <a:prstGeom prst="rect">
-            <a:avLst/>
-          </a:prstGeom>
-        </p:spPr>
-        <p:txBody>
-          <a:bodyPr/>
-          <a:lstStyle>
-            <a:lvl1pPr marL="182880" indent="-182880" algn="l" defTabSz="914400" rtl="0" eaLnBrk="1" latinLnBrk="0" hangingPunct="1">
-              <a:lnSpc>
-                <a:spcPct val="100000"/>
-              </a:lnSpc>
-              <a:spcBef>
-                <a:spcPts val="2000"/>
-              </a:spcBef>
-              <a:buClr>
-                <a:schemeClr val="accent1"/>
-              </a:buClr>
-              <a:buFont typeface="System Font Regular"/>
-              <a:buChar char="+"/>
-              <a:defRPr sz="1800" kern="1200">
-                <a:solidFill>
-                  <a:schemeClr val="tx1"/>
-                </a:solidFill>
-                <a:latin typeface="+mn-lt"/>
-                <a:ea typeface="+mn-ea"/>
-                <a:cs typeface="+mn-cs"/>
-              </a:defRPr>
-            </a:lvl1pPr>
-            <a:lvl2pPr marL="365760" indent="-182880" algn="l" defTabSz="914400" rtl="0" eaLnBrk="1" latinLnBrk="0" hangingPunct="1">
-              <a:lnSpc>
-                <a:spcPct val="100000"/>
-              </a:lnSpc>
-              <a:spcBef>
-                <a:spcPts val="800"/>
-              </a:spcBef>
-              <a:buClr>
-                <a:schemeClr val="tx1"/>
-              </a:buClr>
-              <a:buFont typeface="Arial" panose="020B0604020202020204" pitchFamily="34" charset="0"/>
-              <a:buChar char="•"/>
-              <a:defRPr sz="1600" kern="1200">
-                <a:solidFill>
-                  <a:schemeClr val="tx1"/>
-                </a:solidFill>
-                <a:latin typeface="+mn-lt"/>
-                <a:ea typeface="+mn-ea"/>
-                <a:cs typeface="+mn-cs"/>
-              </a:defRPr>
-            </a:lvl2pPr>
-            <a:lvl3pPr marL="548640" indent="-182880" algn="l" defTabSz="914400" rtl="0" eaLnBrk="1" latinLnBrk="0" hangingPunct="1">
-              <a:lnSpc>
-                <a:spcPct val="100000"/>
-              </a:lnSpc>
-              <a:spcBef>
-                <a:spcPts val="800"/>
-              </a:spcBef>
-              <a:buClrTx/>
-              <a:buFont typeface="Arial" panose="020B0604020202020204" pitchFamily="34" charset="0"/>
-              <a:buChar char="›"/>
-              <a:defRPr sz="1600" kern="1200">
-                <a:solidFill>
-                  <a:schemeClr val="tx1"/>
-                </a:solidFill>
-                <a:latin typeface="+mn-lt"/>
-                <a:ea typeface="+mn-ea"/>
-                <a:cs typeface="+mn-cs"/>
-              </a:defRPr>
-            </a:lvl3pPr>
-            <a:lvl4pPr marL="731520" indent="-182880" algn="l" defTabSz="914400" rtl="0" eaLnBrk="1" latinLnBrk="0" hangingPunct="1">
-              <a:lnSpc>
-                <a:spcPct val="100000"/>
-              </a:lnSpc>
-              <a:spcBef>
-                <a:spcPts val="800"/>
-              </a:spcBef>
-              <a:buClrTx/>
-              <a:buFont typeface="Arial" panose="020B0604020202020204" pitchFamily="34" charset="0"/>
-              <a:buChar char="»"/>
-              <a:defRPr sz="1600" kern="1200">
-                <a:solidFill>
-                  <a:schemeClr val="tx1"/>
-                </a:solidFill>
-                <a:latin typeface="+mn-lt"/>
-                <a:ea typeface="+mn-ea"/>
-                <a:cs typeface="+mn-cs"/>
-              </a:defRPr>
-            </a:lvl4pPr>
-            <a:lvl5pPr marL="914400" indent="-182880" algn="l" defTabSz="914400" rtl="0" eaLnBrk="1" latinLnBrk="0" hangingPunct="1">
-              <a:lnSpc>
-                <a:spcPct val="100000"/>
-              </a:lnSpc>
-              <a:spcBef>
-                <a:spcPts val="800"/>
-              </a:spcBef>
-              <a:buClrTx/>
-              <a:buSzPct val="75000"/>
-              <a:buFont typeface="Wingdings" panose="05000000000000000000" pitchFamily="2" charset="2"/>
-              <a:buChar char="§"/>
-              <a:defRPr sz="1600" kern="1200">
-                <a:solidFill>
-                  <a:schemeClr val="tx1"/>
-                </a:solidFill>
-                <a:latin typeface="+mn-lt"/>
-                <a:ea typeface="+mn-ea"/>
-                <a:cs typeface="+mn-cs"/>
-              </a:defRPr>
-            </a:lvl5pPr>
-            <a:lvl6pPr marL="2514600" indent="-228600" algn="l" defTabSz="914400" rtl="0" eaLnBrk="1" latinLnBrk="0" hangingPunct="1">
-              <a:lnSpc>
-                <a:spcPct val="90000"/>
-              </a:lnSpc>
-              <a:spcBef>
-                <a:spcPts val="500"/>
-              </a:spcBef>
-              <a:buFont typeface="Arial" panose="020B0604020202020204" pitchFamily="34" charset="0"/>
-              <a:buChar char="•"/>
-              <a:defRPr sz="1800" kern="1200">
-                <a:solidFill>
-                  <a:schemeClr val="tx1"/>
-                </a:solidFill>
-                <a:latin typeface="+mn-lt"/>
-                <a:ea typeface="+mn-ea"/>
-                <a:cs typeface="+mn-cs"/>
-              </a:defRPr>
-            </a:lvl6pPr>
-            <a:lvl7pPr marL="2971800" indent="-228600" algn="l" defTabSz="914400" rtl="0" eaLnBrk="1" latinLnBrk="0" hangingPunct="1">
-              <a:lnSpc>
-                <a:spcPct val="90000"/>
-              </a:lnSpc>
-              <a:spcBef>
-                <a:spcPts val="500"/>
-              </a:spcBef>
-              <a:buFont typeface="Arial" panose="020B0604020202020204" pitchFamily="34" charset="0"/>
-              <a:buChar char="•"/>
-              <a:defRPr sz="1800" kern="1200">
-                <a:solidFill>
-                  <a:schemeClr val="tx1"/>
-                </a:solidFill>
-                <a:latin typeface="+mn-lt"/>
-                <a:ea typeface="+mn-ea"/>
-                <a:cs typeface="+mn-cs"/>
-              </a:defRPr>
-            </a:lvl7pPr>
-            <a:lvl8pPr marL="3429000" indent="-228600" algn="l" defTabSz="914400" rtl="0" eaLnBrk="1" latinLnBrk="0" hangingPunct="1">
-              <a:lnSpc>
-                <a:spcPct val="90000"/>
-              </a:lnSpc>
-              <a:spcBef>
-                <a:spcPts val="500"/>
-              </a:spcBef>
-              <a:buFont typeface="Arial" panose="020B0604020202020204" pitchFamily="34" charset="0"/>
-              <a:buChar char="•"/>
-              <a:defRPr sz="1800" kern="1200">
-                <a:solidFill>
-                  <a:schemeClr val="tx1"/>
-                </a:solidFill>
-                <a:latin typeface="+mn-lt"/>
-                <a:ea typeface="+mn-ea"/>
-                <a:cs typeface="+mn-cs"/>
-              </a:defRPr>
-            </a:lvl8pPr>
-            <a:lvl9pPr marL="3886200" indent="-228600" algn="l" defTabSz="914400" rtl="0" eaLnBrk="1" latinLnBrk="0" hangingPunct="1">
-              <a:lnSpc>
-                <a:spcPct val="90000"/>
-              </a:lnSpc>
-              <a:spcBef>
-                <a:spcPts val="500"/>
-              </a:spcBef>
-              <a:buFont typeface="Arial" panose="020B0604020202020204" pitchFamily="34" charset="0"/>
-              <a:buChar char="•"/>
-              <a:defRPr sz="1800" kern="1200">
-                <a:solidFill>
-                  <a:schemeClr val="tx1"/>
-                </a:solidFill>
-                <a:latin typeface="+mn-lt"/>
-                <a:ea typeface="+mn-ea"/>
-                <a:cs typeface="+mn-cs"/>
-              </a:defRPr>
-            </a:lvl9pPr>
-          </a:lstStyle>
-          <a:p>
-            <a:r>
-              <a:rPr lang="en-US" dirty="0"/>
-              <a:t>While the reviewer conducts the manual tests and documents their steps – PlaybackGPT will capture these inputs and convert them into code directly.</a:t>
-            </a:r>
-          </a:p>
-        </p:txBody>
-      </p:sp>
-    </p:spTree>
-    <p:extLst>
-      <p:ext uri="{BB962C8B-B14F-4D97-AF65-F5344CB8AC3E}">
-        <p14:creationId xmlns:p14="http://schemas.microsoft.com/office/powerpoint/2010/main" val="1127949601"/>
       </p:ext>
     </p:extLst>
   </p:cSld>
@@ -29479,19 +30694,39 @@
           <a:p>
             <a:r>
               <a:rPr lang="en-US" dirty="0"/>
-              <a:t>On average a ‘testcase’ takes about 1.5 days – 13 hours</a:t>
+              <a:t>On average a ‘testcase’ takes about </a:t>
+            </a:r>
+            <a:r>
+              <a:rPr lang="en-US" b="1" dirty="0"/>
+              <a:t>1.5 days – 13 hours</a:t>
             </a:r>
           </a:p>
           <a:p>
             <a:r>
               <a:rPr lang="en-US" dirty="0"/>
-              <a:t>The average time it takes to perform a testcase manually would be around 10-20 minutes. Combined with the task of writing the natural language instructions, it would be fair to approximate a maximum of 1 hour for any testcase generation using the prescribed method. </a:t>
+              <a:t>The average time it takes to perform a testcase manually would be around 10-20 minutes. Combined with the task of writing the natural language instructions, it would be fair to approximate a maximum of </a:t>
+            </a:r>
+            <a:r>
+              <a:rPr lang="en-US" b="1" dirty="0"/>
+              <a:t>1 hour </a:t>
+            </a:r>
+            <a:r>
+              <a:rPr lang="en-US" dirty="0"/>
+              <a:t>for any testcase generation using the prescribed method. </a:t>
             </a:r>
           </a:p>
           <a:p>
             <a:r>
               <a:rPr lang="en-US" dirty="0"/>
-              <a:t>This would theoretically increase the efficiency of automation test script generation by 13x.</a:t>
+              <a:t>This would theoretically increase the efficiency of automation test script generation by </a:t>
+            </a:r>
+            <a:r>
+              <a:rPr lang="en-US" sz="2000" b="1" dirty="0"/>
+              <a:t>13x</a:t>
+            </a:r>
+            <a:r>
+              <a:rPr lang="en-US" dirty="0"/>
+              <a:t>.</a:t>
             </a:r>
           </a:p>
           <a:p>

</xml_diff>